<commit_message>
use ExtendedDefaultRules in example
</commit_message>
<xml_diff>
--- a/doc/MongoDBIntro.pptx
+++ b/doc/MongoDBIntro.pptx
@@ -7,9 +7,9 @@
   <p:sldIdLst>
     <p:sldId id="256" r:id="rId2"/>
     <p:sldId id="257" r:id="rId3"/>
-    <p:sldId id="263" r:id="rId4"/>
-    <p:sldId id="260" r:id="rId5"/>
-    <p:sldId id="261" r:id="rId6"/>
+    <p:sldId id="260" r:id="rId4"/>
+    <p:sldId id="261" r:id="rId5"/>
+    <p:sldId id="263" r:id="rId6"/>
     <p:sldId id="259" r:id="rId7"/>
     <p:sldId id="258" r:id="rId8"/>
   </p:sldIdLst>
@@ -295,7 +295,7 @@
             <a:fld id="{56205BF2-8948-8A41-A78C-E8F66968AA65}" type="datetimeFigureOut">
               <a:rPr lang="en-US" smtClean="0"/>
               <a:pPr/>
-              <a:t>7/28/11</a:t>
+              <a:t>7/30/11</a:t>
             </a:fld>
             <a:endParaRPr lang="en-US"/>
           </a:p>
@@ -462,7 +462,7 @@
             <a:fld id="{56205BF2-8948-8A41-A78C-E8F66968AA65}" type="datetimeFigureOut">
               <a:rPr lang="en-US" smtClean="0"/>
               <a:pPr/>
-              <a:t>7/28/11</a:t>
+              <a:t>7/30/11</a:t>
             </a:fld>
             <a:endParaRPr lang="en-US"/>
           </a:p>
@@ -639,7 +639,7 @@
             <a:fld id="{56205BF2-8948-8A41-A78C-E8F66968AA65}" type="datetimeFigureOut">
               <a:rPr lang="en-US" smtClean="0"/>
               <a:pPr/>
-              <a:t>7/28/11</a:t>
+              <a:t>7/30/11</a:t>
             </a:fld>
             <a:endParaRPr lang="en-US"/>
           </a:p>
@@ -806,7 +806,7 @@
             <a:fld id="{56205BF2-8948-8A41-A78C-E8F66968AA65}" type="datetimeFigureOut">
               <a:rPr lang="en-US" smtClean="0"/>
               <a:pPr/>
-              <a:t>7/28/11</a:t>
+              <a:t>7/30/11</a:t>
             </a:fld>
             <a:endParaRPr lang="en-US"/>
           </a:p>
@@ -1049,7 +1049,7 @@
             <a:fld id="{56205BF2-8948-8A41-A78C-E8F66968AA65}" type="datetimeFigureOut">
               <a:rPr lang="en-US" smtClean="0"/>
               <a:pPr/>
-              <a:t>7/28/11</a:t>
+              <a:t>7/30/11</a:t>
             </a:fld>
             <a:endParaRPr lang="en-US"/>
           </a:p>
@@ -1334,7 +1334,7 @@
             <a:fld id="{56205BF2-8948-8A41-A78C-E8F66968AA65}" type="datetimeFigureOut">
               <a:rPr lang="en-US" smtClean="0"/>
               <a:pPr/>
-              <a:t>7/28/11</a:t>
+              <a:t>7/30/11</a:t>
             </a:fld>
             <a:endParaRPr lang="en-US"/>
           </a:p>
@@ -1753,7 +1753,7 @@
             <a:fld id="{56205BF2-8948-8A41-A78C-E8F66968AA65}" type="datetimeFigureOut">
               <a:rPr lang="en-US" smtClean="0"/>
               <a:pPr/>
-              <a:t>7/28/11</a:t>
+              <a:t>7/30/11</a:t>
             </a:fld>
             <a:endParaRPr lang="en-US"/>
           </a:p>
@@ -1868,7 +1868,7 @@
             <a:fld id="{56205BF2-8948-8A41-A78C-E8F66968AA65}" type="datetimeFigureOut">
               <a:rPr lang="en-US" smtClean="0"/>
               <a:pPr/>
-              <a:t>7/28/11</a:t>
+              <a:t>7/30/11</a:t>
             </a:fld>
             <a:endParaRPr lang="en-US"/>
           </a:p>
@@ -1960,7 +1960,7 @@
             <a:fld id="{56205BF2-8948-8A41-A78C-E8F66968AA65}" type="datetimeFigureOut">
               <a:rPr lang="en-US" smtClean="0"/>
               <a:pPr/>
-              <a:t>7/28/11</a:t>
+              <a:t>7/30/11</a:t>
             </a:fld>
             <a:endParaRPr lang="en-US"/>
           </a:p>
@@ -2234,7 +2234,7 @@
             <a:fld id="{56205BF2-8948-8A41-A78C-E8F66968AA65}" type="datetimeFigureOut">
               <a:rPr lang="en-US" smtClean="0"/>
               <a:pPr/>
-              <a:t>7/28/11</a:t>
+              <a:t>7/30/11</a:t>
             </a:fld>
             <a:endParaRPr lang="en-US"/>
           </a:p>
@@ -2484,7 +2484,7 @@
             <a:fld id="{56205BF2-8948-8A41-A78C-E8F66968AA65}" type="datetimeFigureOut">
               <a:rPr lang="en-US" smtClean="0"/>
               <a:pPr/>
-              <a:t>7/28/11</a:t>
+              <a:t>7/30/11</a:t>
             </a:fld>
             <a:endParaRPr lang="en-US"/>
           </a:p>
@@ -2694,7 +2694,7 @@
             <a:fld id="{56205BF2-8948-8A41-A78C-E8F66968AA65}" type="datetimeFigureOut">
               <a:rPr lang="en-US" smtClean="0"/>
               <a:pPr/>
-              <a:t>7/28/11</a:t>
+              <a:t>7/30/11</a:t>
             </a:fld>
             <a:endParaRPr lang="en-US"/>
           </a:p>
@@ -3232,7 +3232,6 @@
               <a:rPr lang="en-US" dirty="0" smtClean="0"/>
               <a:t> data (documents)</a:t>
             </a:r>
-            <a:endParaRPr lang="en-US" dirty="0" smtClean="0"/>
           </a:p>
         </p:txBody>
       </p:sp>
@@ -3306,7 +3305,7 @@
             </a:r>
             <a:r>
               <a:rPr lang="en-US" dirty="0" smtClean="0"/>
-              <a:t> business</a:t>
+              <a:t> data model</a:t>
             </a:r>
             <a:endParaRPr lang="en-US" dirty="0"/>
           </a:p>
@@ -3324,87 +3323,104 @@
         </p:nvSpPr>
         <p:spPr/>
         <p:txBody>
-          <a:bodyPr/>
+          <a:bodyPr>
+            <a:normAutofit fontScale="92500" lnSpcReduction="10000"/>
+          </a:bodyPr>
           <a:lstStyle/>
           <a:p>
             <a:r>
               <a:rPr lang="en-US" dirty="0" smtClean="0"/>
-              <a:t>Open source, free</a:t>
-            </a:r>
-            <a:endParaRPr lang="en-US" dirty="0" smtClean="0"/>
+              <a:t>Database = [Collection]</a:t>
+            </a:r>
           </a:p>
           <a:p>
             <a:r>
               <a:rPr lang="en-US" dirty="0" smtClean="0"/>
-              <a:t>Lead by commercial company, 10gen</a:t>
+              <a:t>Collection = [Document]</a:t>
             </a:r>
           </a:p>
           <a:p>
             <a:r>
               <a:rPr lang="en-US" dirty="0" smtClean="0"/>
-              <a:t>100,000 downloads/month and growing</a:t>
-            </a:r>
-            <a:endParaRPr lang="en-US" dirty="0" smtClean="0"/>
+              <a:t>Document = [Field]</a:t>
+            </a:r>
           </a:p>
           <a:p>
             <a:r>
               <a:rPr lang="en-US" dirty="0" smtClean="0"/>
-              <a:t>In production at</a:t>
-            </a:r>
+              <a:t>Field = (Label, Value)</a:t>
+            </a:r>
+          </a:p>
+          <a:p>
             <a:r>
               <a:rPr lang="en-US" dirty="0" smtClean="0"/>
-              <a:t>:</a:t>
-            </a:r>
-          </a:p>
-          <a:p>
-            <a:pPr lvl="1"/>
-            <a:r>
-              <a:rPr lang="en-US" dirty="0" smtClean="0"/>
-              <a:t>Craigslist</a:t>
-            </a:r>
-            <a:r>
-              <a:rPr lang="en-US" dirty="0" smtClean="0"/>
-              <a:t>, Foursquare, </a:t>
-            </a:r>
-            <a:r>
-              <a:rPr lang="en-US" dirty="0" err="1" smtClean="0"/>
-              <a:t>Shutterfly</a:t>
-            </a:r>
-            <a:r>
-              <a:rPr lang="en-US" dirty="0" smtClean="0"/>
-              <a:t>, MTV</a:t>
-            </a:r>
-            <a:r>
-              <a:rPr lang="en-US" dirty="0" smtClean="0"/>
-              <a:t>,</a:t>
-            </a:r>
-            <a:r>
-              <a:rPr lang="en-US" dirty="0" smtClean="0"/>
-              <a:t> …</a:t>
-            </a:r>
-          </a:p>
-          <a:p>
-            <a:pPr lvl="1"/>
-            <a:r>
-              <a:rPr lang="en-US" dirty="0" smtClean="0"/>
-              <a:t>Several bigger </a:t>
-            </a:r>
-            <a:r>
-              <a:rPr lang="en-US" dirty="0" smtClean="0"/>
-              <a:t>names </a:t>
-            </a:r>
-            <a:r>
-              <a:rPr lang="en-US" dirty="0" smtClean="0"/>
-              <a:t>to </a:t>
-            </a:r>
-            <a:r>
-              <a:rPr lang="en-US" dirty="0" smtClean="0"/>
-              <a:t>be announced soon</a:t>
-            </a:r>
-            <a:endParaRPr lang="en-US" dirty="0" smtClean="0"/>
-          </a:p>
-          <a:p>
-            <a:endParaRPr lang="en-US" dirty="0"/>
+              <a:t>Value = primitive | Document | [Value]</a:t>
+            </a:r>
+          </a:p>
+          <a:p>
+            <a:pPr lvl="1">
+              <a:buNone/>
+            </a:pPr>
+            <a:endParaRPr lang="en-US" dirty="0" smtClean="0">
+              <a:solidFill>
+                <a:srgbClr val="0000FF"/>
+              </a:solidFill>
+            </a:endParaRPr>
+          </a:p>
+          <a:p>
+            <a:pPr lvl="1">
+              <a:buNone/>
+            </a:pPr>
+            <a:r>
+              <a:rPr lang="en-US" dirty="0" smtClean="0">
+                <a:solidFill>
+                  <a:srgbClr val="0000FF"/>
+                </a:solidFill>
+              </a:rPr>
+              <a:t>[“name” =: “Mike”,</a:t>
+            </a:r>
+          </a:p>
+          <a:p>
+            <a:pPr lvl="1">
+              <a:buNone/>
+            </a:pPr>
+            <a:r>
+              <a:rPr lang="en-US" dirty="0" smtClean="0">
+                <a:solidFill>
+                  <a:srgbClr val="0000FF"/>
+                </a:solidFill>
+              </a:rPr>
+              <a:t> “</a:t>
+            </a:r>
+            <a:r>
+              <a:rPr lang="en-US" dirty="0" err="1" smtClean="0">
+                <a:solidFill>
+                  <a:srgbClr val="0000FF"/>
+                </a:solidFill>
+              </a:rPr>
+              <a:t>addr</a:t>
+            </a:r>
+            <a:r>
+              <a:rPr lang="en-US" dirty="0" smtClean="0">
+                <a:solidFill>
+                  <a:srgbClr val="0000FF"/>
+                </a:solidFill>
+              </a:rPr>
+              <a:t>” =: [“city” =: “New York”, “state” =: “NY”],</a:t>
+            </a:r>
+          </a:p>
+          <a:p>
+            <a:pPr lvl="1">
+              <a:buNone/>
+            </a:pPr>
+            <a:r>
+              <a:rPr lang="en-US" dirty="0" smtClean="0">
+                <a:solidFill>
+                  <a:srgbClr val="0000FF"/>
+                </a:solidFill>
+              </a:rPr>
+              <a:t> “scores” =: [10, 20, 35, 25] ]</a:t>
+            </a:r>
           </a:p>
         </p:txBody>
       </p:sp>
@@ -3454,7 +3470,11 @@
             </a:r>
             <a:r>
               <a:rPr lang="en-US" dirty="0" smtClean="0"/>
-              <a:t> data model</a:t>
+              <a:t> query </a:t>
+            </a:r>
+            <a:r>
+              <a:rPr lang="en-US" dirty="0" smtClean="0"/>
+              <a:t>language (EDSL)</a:t>
             </a:r>
             <a:endParaRPr lang="en-US" dirty="0"/>
           </a:p>
@@ -3473,89 +3493,74 @@
         <p:spPr/>
         <p:txBody>
           <a:bodyPr>
-            <a:normAutofit fontScale="92500" lnSpcReduction="10000"/>
+            <a:normAutofit/>
           </a:bodyPr>
           <a:lstStyle/>
           <a:p>
             <a:r>
               <a:rPr lang="en-US" dirty="0" smtClean="0"/>
-              <a:t>Database = [Collection]</a:t>
-            </a:r>
-          </a:p>
-          <a:p>
+              <a:t>Q</a:t>
+            </a:r>
             <a:r>
               <a:rPr lang="en-US" dirty="0" smtClean="0"/>
-              <a:t>Collection = [Document]</a:t>
-            </a:r>
-          </a:p>
-          <a:p>
+              <a:t>uery </a:t>
+            </a:r>
             <a:r>
               <a:rPr lang="en-US" dirty="0" smtClean="0"/>
-              <a:t>Document = [Field]</a:t>
-            </a:r>
-          </a:p>
-          <a:p>
-            <a:r>
-              <a:rPr lang="en-US" dirty="0" smtClean="0"/>
-              <a:t>Field = (Label, Value)</a:t>
-            </a:r>
-          </a:p>
-          <a:p>
-            <a:r>
-              <a:rPr lang="en-US" dirty="0" smtClean="0"/>
-              <a:t>Value = </a:t>
-            </a:r>
-            <a:r>
-              <a:rPr lang="en-US" dirty="0" smtClean="0"/>
-              <a:t>primitive | Document | [Value]</a:t>
-            </a:r>
-            <a:endParaRPr lang="en-US" dirty="0" smtClean="0"/>
-          </a:p>
-          <a:p>
-            <a:pPr lvl="1">
+              <a:t>encoded in document</a:t>
+            </a:r>
+          </a:p>
+          <a:p>
+            <a:pPr>
               <a:buNone/>
             </a:pPr>
-            <a:endParaRPr lang="en-US" dirty="0" smtClean="0">
-              <a:solidFill>
-                <a:srgbClr val="0000FF"/>
-              </a:solidFill>
-            </a:endParaRPr>
-          </a:p>
-          <a:p>
-            <a:pPr lvl="1">
+            <a:r>
+              <a:rPr lang="en-US" sz="2400" dirty="0" smtClean="0">
+                <a:solidFill>
+                  <a:srgbClr val="0000FF"/>
+                </a:solidFill>
+              </a:rPr>
+              <a:t>		select [“name” =: “Mike”] “</a:t>
+            </a:r>
+            <a:r>
+              <a:rPr lang="en-US" sz="2400" dirty="0" err="1" smtClean="0">
+                <a:solidFill>
+                  <a:srgbClr val="0000FF"/>
+                </a:solidFill>
+              </a:rPr>
+              <a:t>coll</a:t>
+            </a:r>
+            <a:r>
+              <a:rPr lang="en-US" sz="2400" dirty="0" smtClean="0">
+                <a:solidFill>
+                  <a:srgbClr val="0000FF"/>
+                </a:solidFill>
+              </a:rPr>
+              <a:t>”</a:t>
+            </a:r>
+          </a:p>
+          <a:p>
+            <a:pPr>
               <a:buNone/>
             </a:pPr>
             <a:r>
-              <a:rPr lang="en-US" dirty="0" smtClean="0">
+              <a:rPr lang="en-US" sz="2400" dirty="0" smtClean="0">
                 <a:solidFill>
                   <a:srgbClr val="0000FF"/>
                 </a:solidFill>
               </a:rPr>
-              <a:t>[</a:t>
-            </a:r>
-            <a:r>
-              <a:rPr lang="en-US" dirty="0" smtClean="0">
+              <a:t>		select [“name” =: </a:t>
+            </a:r>
+            <a:r>
+              <a:rPr lang="en-US" sz="2400" dirty="0" err="1" smtClean="0">
                 <a:solidFill>
                   <a:srgbClr val="0000FF"/>
                 </a:solidFill>
               </a:rPr>
-              <a:t>“name” =: “Mike”</a:t>
-            </a:r>
-            <a:r>
-              <a:rPr lang="en-US" dirty="0" smtClean="0">
-                <a:solidFill>
-                  <a:srgbClr val="0000FF"/>
-                </a:solidFill>
-              </a:rPr>
-              <a:t>,</a:t>
-            </a:r>
-          </a:p>
-          <a:p>
-            <a:pPr lvl="1">
-              <a:buNone/>
-            </a:pPr>
-            <a:r>
-              <a:rPr lang="en-US" dirty="0" smtClean="0">
+              <a:t>Regex</a:t>
+            </a:r>
+            <a:r>
+              <a:rPr lang="en-US" sz="2400" dirty="0" smtClean="0">
                 <a:solidFill>
                   <a:srgbClr val="0000FF"/>
                 </a:solidFill>
@@ -3563,55 +3568,240 @@
               <a:t> “</a:t>
             </a:r>
             <a:r>
-              <a:rPr lang="en-US" dirty="0" err="1" smtClean="0">
+              <a:rPr lang="en-US" sz="2400" dirty="0" err="1" smtClean="0">
                 <a:solidFill>
                   <a:srgbClr val="0000FF"/>
                 </a:solidFill>
               </a:rPr>
-              <a:t>addr</a:t>
-            </a:r>
-            <a:r>
-              <a:rPr lang="en-US" dirty="0" smtClean="0">
+              <a:t>mik</a:t>
+            </a:r>
+            <a:r>
+              <a:rPr lang="en-US" sz="2400" dirty="0" smtClean="0">
                 <a:solidFill>
                   <a:srgbClr val="0000FF"/>
                 </a:solidFill>
               </a:rPr>
-              <a:t>” =: [“city” =: “New York”, “state” =: “NY”],</a:t>
-            </a:r>
-          </a:p>
-          <a:p>
-            <a:pPr lvl="1">
+              <a:t>” “</a:t>
+            </a:r>
+            <a:r>
+              <a:rPr lang="en-US" sz="2400" dirty="0" err="1" smtClean="0">
+                <a:solidFill>
+                  <a:srgbClr val="0000FF"/>
+                </a:solidFill>
+              </a:rPr>
+              <a:t>i</a:t>
+            </a:r>
+            <a:r>
+              <a:rPr lang="en-US" sz="2400" dirty="0" smtClean="0">
+                <a:solidFill>
+                  <a:srgbClr val="0000FF"/>
+                </a:solidFill>
+              </a:rPr>
+              <a:t>”] “</a:t>
+            </a:r>
+            <a:r>
+              <a:rPr lang="en-US" sz="2400" dirty="0" err="1" smtClean="0">
+                <a:solidFill>
+                  <a:srgbClr val="0000FF"/>
+                </a:solidFill>
+              </a:rPr>
+              <a:t>coll</a:t>
+            </a:r>
+            <a:r>
+              <a:rPr lang="en-US" sz="2400" dirty="0" smtClean="0">
+                <a:solidFill>
+                  <a:srgbClr val="0000FF"/>
+                </a:solidFill>
+              </a:rPr>
+              <a:t>”</a:t>
+            </a:r>
+          </a:p>
+          <a:p>
+            <a:pPr>
               <a:buNone/>
             </a:pPr>
             <a:r>
-              <a:rPr lang="en-US" dirty="0" smtClean="0">
+              <a:rPr lang="en-US" sz="2400" dirty="0" smtClean="0">
                 <a:solidFill>
                   <a:srgbClr val="0000FF"/>
                 </a:solidFill>
               </a:rPr>
-              <a:t> “</a:t>
-            </a:r>
-            <a:r>
-              <a:rPr lang="en-US" dirty="0" smtClean="0">
+              <a:t>		select [“</a:t>
+            </a:r>
+            <a:r>
+              <a:rPr lang="en-US" sz="2400" dirty="0" err="1" smtClean="0">
                 <a:solidFill>
                   <a:srgbClr val="0000FF"/>
                 </a:solidFill>
               </a:rPr>
-              <a:t>scores” =: </a:t>
-            </a:r>
-            <a:r>
-              <a:rPr lang="en-US" dirty="0" smtClean="0">
+              <a:t>addr.state</a:t>
+            </a:r>
+            <a:r>
+              <a:rPr lang="en-US" sz="2400" dirty="0" smtClean="0">
                 <a:solidFill>
                   <a:srgbClr val="0000FF"/>
                 </a:solidFill>
               </a:rPr>
-              <a:t>[10, 20, 35, 25] ]</a:t>
-            </a:r>
-            <a:endParaRPr lang="en-US" dirty="0" smtClean="0">
-              <a:solidFill>
-                <a:srgbClr val="0000FF"/>
-              </a:solidFill>
-            </a:endParaRPr>
+              <a:t>” =: “NY”, “scores” =: [“$</a:t>
+            </a:r>
+            <a:r>
+              <a:rPr lang="en-US" sz="2400" dirty="0" err="1" smtClean="0">
+                <a:solidFill>
+                  <a:srgbClr val="0000FF"/>
+                </a:solidFill>
+              </a:rPr>
+              <a:t>gte</a:t>
+            </a:r>
+            <a:r>
+              <a:rPr lang="en-US" sz="2400" dirty="0" smtClean="0">
+                <a:solidFill>
+                  <a:srgbClr val="0000FF"/>
+                </a:solidFill>
+              </a:rPr>
+              <a:t>” =: 30]] “</a:t>
+            </a:r>
+            <a:r>
+              <a:rPr lang="en-US" sz="2400" dirty="0" err="1" smtClean="0">
+                <a:solidFill>
+                  <a:srgbClr val="0000FF"/>
+                </a:solidFill>
+              </a:rPr>
+              <a:t>coll</a:t>
+            </a:r>
+            <a:r>
+              <a:rPr lang="en-US" sz="2400" dirty="0" smtClean="0">
+                <a:solidFill>
+                  <a:srgbClr val="0000FF"/>
+                </a:solidFill>
+              </a:rPr>
+              <a:t>”</a:t>
+            </a:r>
+          </a:p>
+          <a:p>
+            <a:pPr>
+              <a:buNone/>
+            </a:pPr>
+            <a:endParaRPr lang="en-US" sz="2400" dirty="0" smtClean="0"/>
+          </a:p>
+          <a:p>
+            <a:r>
+              <a:rPr lang="en-US" dirty="0" smtClean="0"/>
+              <a:t>Update </a:t>
+            </a:r>
+            <a:r>
+              <a:rPr lang="en-US" dirty="0" smtClean="0"/>
+              <a:t>operation also encoded in document</a:t>
+            </a:r>
+          </a:p>
+          <a:p>
+            <a:pPr>
+              <a:buNone/>
+            </a:pPr>
+            <a:r>
+              <a:rPr lang="en-US" sz="2400" dirty="0" smtClean="0">
+                <a:solidFill>
+                  <a:srgbClr val="0000FF"/>
+                </a:solidFill>
+              </a:rPr>
+              <a:t>	</a:t>
+            </a:r>
+            <a:r>
+              <a:rPr lang="en-US" sz="2400" dirty="0" smtClean="0">
+                <a:solidFill>
+                  <a:srgbClr val="0000FF"/>
+                </a:solidFill>
+              </a:rPr>
+              <a:t>	modify</a:t>
+            </a:r>
+          </a:p>
+          <a:p>
+            <a:pPr>
+              <a:buNone/>
+            </a:pPr>
+            <a:r>
+              <a:rPr lang="en-US" sz="2400" dirty="0" smtClean="0">
+                <a:solidFill>
+                  <a:srgbClr val="0000FF"/>
+                </a:solidFill>
+              </a:rPr>
+              <a:t>			(select [“name” =: “Mike”] “</a:t>
+            </a:r>
+            <a:r>
+              <a:rPr lang="en-US" sz="2400" dirty="0" err="1" smtClean="0">
+                <a:solidFill>
+                  <a:srgbClr val="0000FF"/>
+                </a:solidFill>
+              </a:rPr>
+              <a:t>coll</a:t>
+            </a:r>
+            <a:r>
+              <a:rPr lang="en-US" sz="2400" dirty="0" smtClean="0">
+                <a:solidFill>
+                  <a:srgbClr val="0000FF"/>
+                </a:solidFill>
+              </a:rPr>
+              <a:t>”)</a:t>
+            </a:r>
+          </a:p>
+          <a:p>
+            <a:pPr>
+              <a:buNone/>
+            </a:pPr>
+            <a:r>
+              <a:rPr lang="en-US" sz="2400" dirty="0" smtClean="0">
+                <a:solidFill>
+                  <a:srgbClr val="0000FF"/>
+                </a:solidFill>
+              </a:rPr>
+              <a:t>			[</a:t>
+            </a:r>
+            <a:r>
+              <a:rPr lang="en-US" sz="2400" dirty="0" smtClean="0">
+                <a:solidFill>
+                  <a:srgbClr val="0000FF"/>
+                </a:solidFill>
+              </a:rPr>
+              <a:t>“$push” </a:t>
+            </a:r>
+            <a:r>
+              <a:rPr lang="en-US" sz="2400" dirty="0" smtClean="0">
+                <a:solidFill>
+                  <a:srgbClr val="0000FF"/>
+                </a:solidFill>
+              </a:rPr>
+              <a:t>=: [</a:t>
+            </a:r>
+            <a:r>
+              <a:rPr lang="en-US" sz="2400" smtClean="0">
+                <a:solidFill>
+                  <a:srgbClr val="0000FF"/>
+                </a:solidFill>
+              </a:rPr>
+              <a:t>“scores” </a:t>
+            </a:r>
+            <a:r>
+              <a:rPr lang="en-US" sz="2400" dirty="0" smtClean="0">
+                <a:solidFill>
+                  <a:srgbClr val="0000FF"/>
+                </a:solidFill>
+              </a:rPr>
+              <a:t>=: 22]</a:t>
+            </a:r>
+            <a:r>
+              <a:rPr lang="en-US" sz="2400" dirty="0" smtClean="0">
+                <a:solidFill>
+                  <a:srgbClr val="0000FF"/>
+                </a:solidFill>
+              </a:rPr>
+              <a:t>]</a:t>
+            </a:r>
+            <a:endParaRPr lang="en-US" sz="2400" dirty="0" smtClean="0"/>
+          </a:p>
+          <a:p>
+            <a:pPr>
+              <a:buNone/>
+            </a:pPr>
+            <a:endParaRPr lang="en-US" sz="2400" dirty="0" smtClean="0"/>
           </a:p>
         </p:txBody>
       </p:sp>
@@ -3656,12 +3846,8 @@
           <a:lstStyle/>
           <a:p>
             <a:r>
-              <a:rPr lang="en-US" dirty="0" err="1" smtClean="0"/>
-              <a:t>MongoDB</a:t>
-            </a:r>
-            <a:r>
               <a:rPr lang="en-US" dirty="0" smtClean="0"/>
-              <a:t> query language</a:t>
+              <a:t>Indexes</a:t>
             </a:r>
             <a:endParaRPr lang="en-US" dirty="0"/>
           </a:p>
@@ -3679,22 +3865,12 @@
         </p:nvSpPr>
         <p:spPr/>
         <p:txBody>
-          <a:bodyPr>
-            <a:normAutofit/>
-          </a:bodyPr>
+          <a:bodyPr/>
           <a:lstStyle/>
           <a:p>
             <a:r>
               <a:rPr lang="en-US" dirty="0" smtClean="0"/>
-              <a:t>EDSL</a:t>
-            </a:r>
-            <a:r>
-              <a:rPr lang="en-US" dirty="0" smtClean="0"/>
-              <a:t>: query encoded in </a:t>
-            </a:r>
-            <a:r>
-              <a:rPr lang="en-US" dirty="0" smtClean="0"/>
-              <a:t>document</a:t>
+              <a:t>Create indexes to speed up common queries</a:t>
             </a:r>
           </a:p>
           <a:p>
@@ -3702,12 +3878,20 @@
               <a:buNone/>
             </a:pPr>
             <a:r>
-              <a:rPr lang="en-US" sz="2800" dirty="0" smtClean="0">
+              <a:rPr lang="en-US" sz="2400" dirty="0" smtClean="0">
                 <a:solidFill>
                   <a:srgbClr val="0000FF"/>
                 </a:solidFill>
               </a:rPr>
-              <a:t>		</a:t>
+              <a:t>		index “</a:t>
+            </a:r>
+            <a:r>
+              <a:rPr lang="en-US" sz="2400" dirty="0" err="1" smtClean="0">
+                <a:solidFill>
+                  <a:srgbClr val="0000FF"/>
+                </a:solidFill>
+              </a:rPr>
+              <a:t>coll</a:t>
             </a:r>
             <a:r>
               <a:rPr lang="en-US" sz="2400" dirty="0" smtClean="0">
@@ -3715,15 +3899,52 @@
                   <a:srgbClr val="0000FF"/>
                 </a:solidFill>
               </a:rPr>
-              <a:t>[</a:t>
-            </a:r>
+              <a:t>” [“name” =: 1]</a:t>
+            </a:r>
+          </a:p>
+          <a:p>
+            <a:pPr>
+              <a:buNone/>
+            </a:pPr>
             <a:r>
               <a:rPr lang="en-US" sz="2400" dirty="0" smtClean="0">
                 <a:solidFill>
                   <a:srgbClr val="0000FF"/>
                 </a:solidFill>
               </a:rPr>
-              <a:t>“name” =: “Mike”]</a:t>
+              <a:t>		index “</a:t>
+            </a:r>
+            <a:r>
+              <a:rPr lang="en-US" sz="2400" dirty="0" err="1" smtClean="0">
+                <a:solidFill>
+                  <a:srgbClr val="0000FF"/>
+                </a:solidFill>
+              </a:rPr>
+              <a:t>coll</a:t>
+            </a:r>
+            <a:r>
+              <a:rPr lang="en-US" sz="2400" dirty="0" smtClean="0">
+                <a:solidFill>
+                  <a:srgbClr val="0000FF"/>
+                </a:solidFill>
+              </a:rPr>
+              <a:t>” [“</a:t>
+            </a:r>
+            <a:r>
+              <a:rPr lang="en-US" sz="2400" dirty="0" err="1" smtClean="0">
+                <a:solidFill>
+                  <a:srgbClr val="0000FF"/>
+                </a:solidFill>
+              </a:rPr>
+              <a:t>addr.state</a:t>
+            </a:r>
+            <a:r>
+              <a:rPr lang="en-US" sz="2400" dirty="0" smtClean="0">
+                <a:solidFill>
+                  <a:srgbClr val="0000FF"/>
+                </a:solidFill>
+              </a:rPr>
+              <a:t>” =: 1, “scores” =: -1]</a:t>
             </a:r>
           </a:p>
           <a:p>
@@ -3731,273 +3952,21 @@
               <a:buNone/>
             </a:pPr>
             <a:r>
-              <a:rPr lang="en-US" sz="2400" dirty="0" smtClean="0">
+              <a:rPr lang="en-US" dirty="0" smtClean="0">
                 <a:solidFill>
                   <a:srgbClr val="0000FF"/>
                 </a:solidFill>
               </a:rPr>
-              <a:t>		[</a:t>
-            </a:r>
-            <a:r>
-              <a:rPr lang="en-US" sz="2400" dirty="0" smtClean="0">
-                <a:solidFill>
-                  <a:srgbClr val="0000FF"/>
-                </a:solidFill>
-              </a:rPr>
-              <a:t>“name” =: </a:t>
-            </a:r>
-            <a:r>
-              <a:rPr lang="en-US" sz="2400" dirty="0" err="1" smtClean="0">
-                <a:solidFill>
-                  <a:srgbClr val="0000FF"/>
-                </a:solidFill>
-              </a:rPr>
-              <a:t>Regex</a:t>
-            </a:r>
-            <a:r>
-              <a:rPr lang="en-US" sz="2400" dirty="0" smtClean="0">
-                <a:solidFill>
-                  <a:srgbClr val="0000FF"/>
-                </a:solidFill>
-              </a:rPr>
-              <a:t> “</a:t>
-            </a:r>
-            <a:r>
-              <a:rPr lang="en-US" sz="2400" dirty="0" err="1" smtClean="0">
-                <a:solidFill>
-                  <a:srgbClr val="0000FF"/>
-                </a:solidFill>
-              </a:rPr>
-              <a:t>mik</a:t>
-            </a:r>
-            <a:r>
-              <a:rPr lang="en-US" sz="2400" dirty="0" smtClean="0">
-                <a:solidFill>
-                  <a:srgbClr val="0000FF"/>
-                </a:solidFill>
-              </a:rPr>
-              <a:t>” “</a:t>
-            </a:r>
-            <a:r>
-              <a:rPr lang="en-US" sz="2400" dirty="0" err="1" smtClean="0">
-                <a:solidFill>
-                  <a:srgbClr val="0000FF"/>
-                </a:solidFill>
-              </a:rPr>
-              <a:t>i</a:t>
-            </a:r>
-            <a:r>
-              <a:rPr lang="en-US" sz="2400" dirty="0" smtClean="0">
-                <a:solidFill>
-                  <a:srgbClr val="0000FF"/>
-                </a:solidFill>
-              </a:rPr>
-              <a:t>”]</a:t>
-            </a:r>
-            <a:endParaRPr lang="en-US" sz="2400" dirty="0" smtClean="0">
+              <a:t>	</a:t>
+            </a:r>
+            <a:endParaRPr lang="en-US" sz="3600" dirty="0" smtClean="0">
               <a:solidFill>
                 <a:srgbClr val="0000FF"/>
               </a:solidFill>
             </a:endParaRPr>
           </a:p>
           <a:p>
-            <a:pPr>
-              <a:buNone/>
-            </a:pPr>
-            <a:r>
-              <a:rPr lang="en-US" sz="2400" dirty="0" smtClean="0">
-                <a:solidFill>
-                  <a:srgbClr val="0000FF"/>
-                </a:solidFill>
-              </a:rPr>
-              <a:t>		[</a:t>
-            </a:r>
-            <a:r>
-              <a:rPr lang="en-US" sz="2400" dirty="0" smtClean="0">
-                <a:solidFill>
-                  <a:srgbClr val="0000FF"/>
-                </a:solidFill>
-              </a:rPr>
-              <a:t>“</a:t>
-            </a:r>
-            <a:r>
-              <a:rPr lang="en-US" sz="2400" dirty="0" err="1" smtClean="0">
-                <a:solidFill>
-                  <a:srgbClr val="0000FF"/>
-                </a:solidFill>
-              </a:rPr>
-              <a:t>addr.state</a:t>
-            </a:r>
-            <a:r>
-              <a:rPr lang="en-US" sz="2400" dirty="0" smtClean="0">
-                <a:solidFill>
-                  <a:srgbClr val="0000FF"/>
-                </a:solidFill>
-              </a:rPr>
-              <a:t>” =: “NY”, “scores” =:</a:t>
-            </a:r>
-            <a:r>
-              <a:rPr lang="en-US" sz="2400" dirty="0" smtClean="0">
-                <a:solidFill>
-                  <a:srgbClr val="0000FF"/>
-                </a:solidFill>
-              </a:rPr>
-              <a:t> </a:t>
-            </a:r>
-            <a:r>
-              <a:rPr lang="en-US" sz="2400" dirty="0" smtClean="0">
-                <a:solidFill>
-                  <a:srgbClr val="0000FF"/>
-                </a:solidFill>
-              </a:rPr>
-              <a:t>[“$</a:t>
-            </a:r>
-            <a:r>
-              <a:rPr lang="en-US" sz="2400" dirty="0" err="1" smtClean="0">
-                <a:solidFill>
-                  <a:srgbClr val="0000FF"/>
-                </a:solidFill>
-              </a:rPr>
-              <a:t>gte</a:t>
-            </a:r>
-            <a:r>
-              <a:rPr lang="en-US" sz="2400" dirty="0" smtClean="0">
-                <a:solidFill>
-                  <a:srgbClr val="0000FF"/>
-                </a:solidFill>
-              </a:rPr>
-              <a:t>” =:</a:t>
-            </a:r>
-            <a:r>
-              <a:rPr lang="en-US" sz="2400" dirty="0" smtClean="0">
-                <a:solidFill>
-                  <a:srgbClr val="0000FF"/>
-                </a:solidFill>
-              </a:rPr>
-              <a:t> 30]]</a:t>
-            </a:r>
-          </a:p>
-          <a:p>
-            <a:pPr>
-              <a:buNone/>
-            </a:pPr>
-            <a:endParaRPr lang="en-US" sz="2400" dirty="0" smtClean="0"/>
-          </a:p>
-          <a:p>
-            <a:r>
-              <a:rPr lang="en-US" dirty="0" smtClean="0"/>
-              <a:t>Create indexes to speed up common queries</a:t>
-            </a:r>
-          </a:p>
-          <a:p>
-            <a:pPr>
-              <a:buNone/>
-            </a:pPr>
-            <a:r>
-              <a:rPr lang="en-US" sz="2400" dirty="0" smtClean="0">
-                <a:solidFill>
-                  <a:srgbClr val="0000FF"/>
-                </a:solidFill>
-              </a:rPr>
-              <a:t>		index “collection” [</a:t>
-            </a:r>
-            <a:r>
-              <a:rPr lang="en-US" sz="2400" dirty="0" smtClean="0">
-                <a:solidFill>
-                  <a:srgbClr val="0000FF"/>
-                </a:solidFill>
-              </a:rPr>
-              <a:t>“name” =:</a:t>
-            </a:r>
-            <a:r>
-              <a:rPr lang="en-US" sz="2400" dirty="0" smtClean="0">
-                <a:solidFill>
-                  <a:srgbClr val="0000FF"/>
-                </a:solidFill>
-              </a:rPr>
-              <a:t> 1]</a:t>
-            </a:r>
-            <a:endParaRPr lang="en-US" sz="2400" dirty="0" smtClean="0">
-              <a:solidFill>
-                <a:srgbClr val="0000FF"/>
-              </a:solidFill>
-            </a:endParaRPr>
-          </a:p>
-          <a:p>
-            <a:pPr>
-              <a:buNone/>
-            </a:pPr>
-            <a:r>
-              <a:rPr lang="en-US" sz="2400" dirty="0" smtClean="0">
-                <a:solidFill>
-                  <a:srgbClr val="0000FF"/>
-                </a:solidFill>
-              </a:rPr>
-              <a:t>	</a:t>
-            </a:r>
-            <a:r>
-              <a:rPr lang="en-US" sz="2400" dirty="0" smtClean="0">
-                <a:solidFill>
-                  <a:srgbClr val="0000FF"/>
-                </a:solidFill>
-              </a:rPr>
-              <a:t>	index “collection” [“</a:t>
-            </a:r>
-            <a:r>
-              <a:rPr lang="en-US" sz="2400" dirty="0" err="1" smtClean="0">
-                <a:solidFill>
-                  <a:srgbClr val="0000FF"/>
-                </a:solidFill>
-              </a:rPr>
-              <a:t>addr.state</a:t>
-            </a:r>
-            <a:r>
-              <a:rPr lang="en-US" sz="2400" dirty="0" smtClean="0">
-                <a:solidFill>
-                  <a:srgbClr val="0000FF"/>
-                </a:solidFill>
-              </a:rPr>
-              <a:t>” </a:t>
-            </a:r>
-            <a:r>
-              <a:rPr lang="en-US" sz="2400" dirty="0" smtClean="0">
-                <a:solidFill>
-                  <a:srgbClr val="0000FF"/>
-                </a:solidFill>
-              </a:rPr>
-              <a:t>=:</a:t>
-            </a:r>
-            <a:r>
-              <a:rPr lang="en-US" sz="2400" dirty="0" smtClean="0">
-                <a:solidFill>
-                  <a:srgbClr val="0000FF"/>
-                </a:solidFill>
-              </a:rPr>
-              <a:t> 1, “scores” =: -1]</a:t>
-            </a:r>
-            <a:endParaRPr lang="en-US" dirty="0" smtClean="0">
-              <a:solidFill>
-                <a:srgbClr val="0000FF"/>
-              </a:solidFill>
-            </a:endParaRPr>
-          </a:p>
-          <a:p>
-            <a:pPr>
-              <a:buNone/>
-            </a:pPr>
-            <a:r>
-              <a:rPr lang="en-US" dirty="0" smtClean="0">
-                <a:solidFill>
-                  <a:srgbClr val="0000FF"/>
-                </a:solidFill>
-              </a:rPr>
-              <a:t>	</a:t>
-            </a:r>
-            <a:endParaRPr lang="en-US" sz="2800" dirty="0" smtClean="0">
-              <a:solidFill>
-                <a:srgbClr val="0000FF"/>
-              </a:solidFill>
-            </a:endParaRPr>
+            <a:endParaRPr lang="en-US" dirty="0"/>
           </a:p>
         </p:txBody>
       </p:sp>
@@ -4182,7 +4151,6 @@
               <a:rPr lang="en-US" dirty="0" smtClean="0"/>
               <a:t>Drivers exist for most languages</a:t>
             </a:r>
-            <a:endParaRPr lang="en-US" dirty="0" smtClean="0"/>
           </a:p>
           <a:p>
             <a:r>

</xml_diff>

<commit_message>
small edit to slides
</commit_message>
<xml_diff>
--- a/doc/MongoDBIntro.pptx
+++ b/doc/MongoDBIntro.pptx
@@ -3690,7 +3690,7 @@
             </a:r>
             <a:r>
               <a:rPr lang="en-US" dirty="0" smtClean="0"/>
-              <a:t>operation also encoded in document</a:t>
+              <a:t>also encoded in document</a:t>
             </a:r>
           </a:p>
           <a:p>
@@ -3772,7 +3772,7 @@
               <a:t>=: [</a:t>
             </a:r>
             <a:r>
-              <a:rPr lang="en-US" sz="2400" smtClean="0">
+              <a:rPr lang="en-US" sz="2400" dirty="0" smtClean="0">
                 <a:solidFill>
                   <a:srgbClr val="0000FF"/>
                 </a:solidFill>

</xml_diff>